<commit_message>
Updated Feb 20 presentation
</commit_message>
<xml_diff>
--- a/documentation/slides/PresentationFeb20.pptx
+++ b/documentation/slides/PresentationFeb20.pptx
@@ -1093,7 +1093,7 @@
   <p:cSld>
     <p:spTree>
       <p:nvGrpSpPr>
-        <p:cNvPr id="156" name="Shape 156"/>
+        <p:cNvPr id="157" name="Shape 157"/>
         <p:cNvGrpSpPr/>
         <p:nvPr/>
       </p:nvGrpSpPr>
@@ -1107,7 +1107,7 @@
       </p:grpSpPr>
       <p:sp>
         <p:nvSpPr>
-          <p:cNvPr id="157" name="Google Shape;157;g4fd3ce7bb5_1_0:notes"/>
+          <p:cNvPr id="158" name="Google Shape;158;g4fd3ce7bb5_1_0:notes"/>
           <p:cNvSpPr/>
           <p:nvPr>
             <p:ph idx="2" type="sldImg"/>
@@ -1142,7 +1142,7 @@
       </p:sp>
       <p:sp>
         <p:nvSpPr>
-          <p:cNvPr id="158" name="Google Shape;158;g4fd3ce7bb5_1_0:notes"/>
+          <p:cNvPr id="159" name="Google Shape;159;g4fd3ce7bb5_1_0:notes"/>
           <p:cNvSpPr txBox="1"/>
           <p:nvPr>
             <p:ph idx="1" type="body"/>
@@ -1192,7 +1192,7 @@
   <p:cSld>
     <p:spTree>
       <p:nvGrpSpPr>
-        <p:cNvPr id="162" name="Shape 162"/>
+        <p:cNvPr id="163" name="Shape 163"/>
         <p:cNvGrpSpPr/>
         <p:nvPr/>
       </p:nvGrpSpPr>
@@ -1206,7 +1206,7 @@
       </p:grpSpPr>
       <p:sp>
         <p:nvSpPr>
-          <p:cNvPr id="163" name="Google Shape;163;g4fd3ce7bb5_0_14:notes"/>
+          <p:cNvPr id="164" name="Google Shape;164;g4fd3ce7bb5_0_14:notes"/>
           <p:cNvSpPr/>
           <p:nvPr>
             <p:ph idx="2" type="sldImg"/>
@@ -1241,7 +1241,7 @@
       </p:sp>
       <p:sp>
         <p:nvSpPr>
-          <p:cNvPr id="164" name="Google Shape;164;g4fd3ce7bb5_0_14:notes"/>
+          <p:cNvPr id="165" name="Google Shape;165;g4fd3ce7bb5_0_14:notes"/>
           <p:cNvSpPr txBox="1"/>
           <p:nvPr>
             <p:ph idx="1" type="body"/>
@@ -1291,7 +1291,7 @@
   <p:cSld>
     <p:spTree>
       <p:nvGrpSpPr>
-        <p:cNvPr id="170" name="Shape 170"/>
+        <p:cNvPr id="171" name="Shape 171"/>
         <p:cNvGrpSpPr/>
         <p:nvPr/>
       </p:nvGrpSpPr>
@@ -1305,7 +1305,7 @@
       </p:grpSpPr>
       <p:sp>
         <p:nvSpPr>
-          <p:cNvPr id="171" name="Google Shape;171;g4e9aba5072_0_5:notes"/>
+          <p:cNvPr id="172" name="Google Shape;172;g4e9aba5072_0_5:notes"/>
           <p:cNvSpPr/>
           <p:nvPr>
             <p:ph idx="2" type="sldImg"/>
@@ -1340,7 +1340,7 @@
       </p:sp>
       <p:sp>
         <p:nvSpPr>
-          <p:cNvPr id="172" name="Google Shape;172;g4e9aba5072_0_5:notes"/>
+          <p:cNvPr id="173" name="Google Shape;173;g4e9aba5072_0_5:notes"/>
           <p:cNvSpPr txBox="1"/>
           <p:nvPr>
             <p:ph idx="1" type="body"/>
@@ -1391,7 +1391,7 @@
   <p:cSld>
     <p:spTree>
       <p:nvGrpSpPr>
-        <p:cNvPr id="178" name="Shape 178"/>
+        <p:cNvPr id="179" name="Shape 179"/>
         <p:cNvGrpSpPr/>
         <p:nvPr/>
       </p:nvGrpSpPr>
@@ -1405,7 +1405,7 @@
       </p:grpSpPr>
       <p:sp>
         <p:nvSpPr>
-          <p:cNvPr id="179" name="Google Shape;179;g4ebcf7c756_0_8:notes"/>
+          <p:cNvPr id="180" name="Google Shape;180;g4ebcf7c756_0_8:notes"/>
           <p:cNvSpPr/>
           <p:nvPr>
             <p:ph idx="2" type="sldImg"/>
@@ -1440,7 +1440,7 @@
       </p:sp>
       <p:sp>
         <p:nvSpPr>
-          <p:cNvPr id="180" name="Google Shape;180;g4ebcf7c756_0_8:notes"/>
+          <p:cNvPr id="181" name="Google Shape;181;g4ebcf7c756_0_8:notes"/>
           <p:cNvSpPr txBox="1"/>
           <p:nvPr>
             <p:ph idx="1" type="body"/>
@@ -10222,7 +10222,7 @@
         </p:nvSpPr>
         <p:spPr>
           <a:xfrm>
-            <a:off x="1297500" y="393750"/>
+            <a:off x="1297500" y="614900"/>
             <a:ext cx="7038900" cy="914100"/>
           </a:xfrm>
           <a:prstGeom prst="rect">
@@ -10307,8 +10307,36 @@
         </p:blipFill>
         <p:spPr>
           <a:xfrm>
-            <a:off x="889875" y="1307850"/>
+            <a:off x="140700" y="1307850"/>
             <a:ext cx="4437947" cy="3530850"/>
+          </a:xfrm>
+          <a:prstGeom prst="rect">
+            <a:avLst/>
+          </a:prstGeom>
+          <a:noFill/>
+          <a:ln>
+            <a:noFill/>
+          </a:ln>
+        </p:spPr>
+      </p:pic>
+      <p:pic>
+        <p:nvPicPr>
+          <p:cNvPr id="156" name="Google Shape;156;p16"/>
+          <p:cNvPicPr preferRelativeResize="0"/>
+          <p:nvPr/>
+        </p:nvPicPr>
+        <p:blipFill>
+          <a:blip r:embed="rId4">
+            <a:alphaModFix/>
+          </a:blip>
+          <a:stretch>
+            <a:fillRect/>
+          </a:stretch>
+        </p:blipFill>
+        <p:spPr>
+          <a:xfrm>
+            <a:off x="4918351" y="705975"/>
+            <a:ext cx="4081848" cy="4132724"/>
           </a:xfrm>
           <a:prstGeom prst="rect">
             <a:avLst/>
@@ -10332,7 +10360,7 @@
   <p:cSld>
     <p:spTree>
       <p:nvGrpSpPr>
-        <p:cNvPr id="159" name="Shape 159"/>
+        <p:cNvPr id="160" name="Shape 160"/>
         <p:cNvGrpSpPr/>
         <p:nvPr/>
       </p:nvGrpSpPr>
@@ -10346,7 +10374,7 @@
       </p:grpSpPr>
       <p:sp>
         <p:nvSpPr>
-          <p:cNvPr id="160" name="Google Shape;160;p17"/>
+          <p:cNvPr id="161" name="Google Shape;161;p17"/>
           <p:cNvSpPr txBox="1"/>
           <p:nvPr>
             <p:ph type="title"/>
@@ -10354,7 +10382,7 @@
         </p:nvSpPr>
         <p:spPr>
           <a:xfrm>
-            <a:off x="1297500" y="393750"/>
+            <a:off x="1321150" y="393750"/>
             <a:ext cx="7038900" cy="914100"/>
           </a:xfrm>
           <a:prstGeom prst="rect">
@@ -10386,7 +10414,7 @@
       </p:sp>
       <p:sp>
         <p:nvSpPr>
-          <p:cNvPr id="161" name="Google Shape;161;p17"/>
+          <p:cNvPr id="162" name="Google Shape;162;p17"/>
           <p:cNvSpPr txBox="1"/>
           <p:nvPr>
             <p:ph idx="1" type="body"/>
@@ -10453,7 +10481,7 @@
             </a:pPr>
             <a:r>
               <a:rPr lang="en"/>
-              <a:t>Connecting to Massmine socket</a:t>
+              <a:t>Communicating with Massmine socket</a:t>
             </a:r>
             <a:endParaRPr/>
           </a:p>
@@ -10908,7 +10936,7 @@
   <p:cSld>
     <p:spTree>
       <p:nvGrpSpPr>
-        <p:cNvPr id="165" name="Shape 165"/>
+        <p:cNvPr id="166" name="Shape 166"/>
         <p:cNvGrpSpPr/>
         <p:nvPr/>
       </p:nvGrpSpPr>
@@ -10922,7 +10950,7 @@
       </p:grpSpPr>
       <p:sp>
         <p:nvSpPr>
-          <p:cNvPr id="166" name="Google Shape;166;p18"/>
+          <p:cNvPr id="167" name="Google Shape;167;p18"/>
           <p:cNvSpPr txBox="1"/>
           <p:nvPr>
             <p:ph type="title"/>
@@ -10962,7 +10990,7 @@
       </p:sp>
       <p:sp>
         <p:nvSpPr>
-          <p:cNvPr id="167" name="Google Shape;167;p18"/>
+          <p:cNvPr id="168" name="Google Shape;168;p18"/>
           <p:cNvSpPr txBox="1"/>
           <p:nvPr>
             <p:ph idx="1" type="body"/>
@@ -11002,7 +11030,7 @@
       </p:sp>
       <p:pic>
         <p:nvPicPr>
-          <p:cNvPr id="168" name="Google Shape;168;p18"/>
+          <p:cNvPr id="169" name="Google Shape;169;p18"/>
           <p:cNvPicPr preferRelativeResize="0"/>
           <p:nvPr/>
         </p:nvPicPr>
@@ -11029,7 +11057,7 @@
       </p:pic>
       <p:pic>
         <p:nvPicPr>
-          <p:cNvPr id="169" name="Google Shape;169;p18"/>
+          <p:cNvPr id="170" name="Google Shape;170;p18"/>
           <p:cNvPicPr preferRelativeResize="0"/>
           <p:nvPr/>
         </p:nvPicPr>
@@ -11068,7 +11096,7 @@
   <p:cSld>
     <p:spTree>
       <p:nvGrpSpPr>
-        <p:cNvPr id="173" name="Shape 173"/>
+        <p:cNvPr id="174" name="Shape 174"/>
         <p:cNvGrpSpPr/>
         <p:nvPr/>
       </p:nvGrpSpPr>
@@ -11082,7 +11110,7 @@
       </p:grpSpPr>
       <p:sp>
         <p:nvSpPr>
-          <p:cNvPr id="174" name="Google Shape;174;p19"/>
+          <p:cNvPr id="175" name="Google Shape;175;p19"/>
           <p:cNvSpPr txBox="1"/>
           <p:nvPr>
             <p:ph type="title"/>
@@ -11122,7 +11150,7 @@
       </p:sp>
       <p:sp>
         <p:nvSpPr>
-          <p:cNvPr id="175" name="Google Shape;175;p19"/>
+          <p:cNvPr id="176" name="Google Shape;176;p19"/>
           <p:cNvSpPr txBox="1"/>
           <p:nvPr>
             <p:ph idx="1" type="body"/>
@@ -11162,7 +11190,7 @@
       </p:sp>
       <p:pic>
         <p:nvPicPr>
-          <p:cNvPr id="176" name="Google Shape;176;p19"/>
+          <p:cNvPr id="177" name="Google Shape;177;p19"/>
           <p:cNvPicPr preferRelativeResize="0"/>
           <p:nvPr/>
         </p:nvPicPr>
@@ -11190,7 +11218,7 @@
       </p:pic>
       <p:pic>
         <p:nvPicPr>
-          <p:cNvPr id="177" name="Google Shape;177;p19"/>
+          <p:cNvPr id="178" name="Google Shape;178;p19"/>
           <p:cNvPicPr preferRelativeResize="0"/>
           <p:nvPr/>
         </p:nvPicPr>
@@ -11229,7 +11257,7 @@
   <p:cSld>
     <p:spTree>
       <p:nvGrpSpPr>
-        <p:cNvPr id="181" name="Shape 181"/>
+        <p:cNvPr id="182" name="Shape 182"/>
         <p:cNvGrpSpPr/>
         <p:nvPr/>
       </p:nvGrpSpPr>
@@ -11243,7 +11271,7 @@
       </p:grpSpPr>
       <p:sp>
         <p:nvSpPr>
-          <p:cNvPr id="182" name="Google Shape;182;p20"/>
+          <p:cNvPr id="183" name="Google Shape;183;p20"/>
           <p:cNvSpPr txBox="1"/>
           <p:nvPr>
             <p:ph type="title"/>
@@ -11283,7 +11311,7 @@
       </p:sp>
       <p:sp>
         <p:nvSpPr>
-          <p:cNvPr id="183" name="Google Shape;183;p20"/>
+          <p:cNvPr id="184" name="Google Shape;184;p20"/>
           <p:cNvSpPr txBox="1"/>
           <p:nvPr>
             <p:ph idx="1" type="body"/>
@@ -11323,7 +11351,7 @@
       </p:sp>
       <p:pic>
         <p:nvPicPr>
-          <p:cNvPr id="184" name="Google Shape;184;p20"/>
+          <p:cNvPr id="185" name="Google Shape;185;p20"/>
           <p:cNvPicPr preferRelativeResize="0"/>
           <p:nvPr/>
         </p:nvPicPr>

</xml_diff>